<commit_message>
Update Schedule Process in local project file
Also updated the schedule process screenshots to higher fidelity in the folder, report and powerpoint.
Removed the schedule folder in schedulepolling
Updates Readme.md for schedule polling
</commit_message>
<xml_diff>
--- a/Documentations/EI Presentation.pptx
+++ b/Documentations/EI Presentation.pptx
@@ -136,6 +136,362 @@
 
 <file path=ppt/changesInfos/changesInfo1.xml><?xml version="1.0" encoding="utf-8"?>
 <pc:chgInfo xmlns:a="http://schemas.openxmlformats.org/drawingml/2006/main" xmlns:r="http://schemas.openxmlformats.org/officeDocument/2006/relationships" xmlns:ac="http://schemas.microsoft.com/office/drawing/2013/main/command" xmlns:pc="http://schemas.microsoft.com/office/powerpoint/2013/main/command">
+  <pc:docChgLst>
+    <pc:chgData name="Eugene CHOY Wen Jia" userId="f0093c6c-aad3-47c8-981f-e49faae5c851" providerId="ADAL" clId="{B65169D4-58A5-4377-916D-9049F8FD685F}"/>
+    <pc:docChg chg="undo custSel addSld modSld sldOrd">
+      <pc:chgData name="Eugene CHOY Wen Jia" userId="f0093c6c-aad3-47c8-981f-e49faae5c851" providerId="ADAL" clId="{B65169D4-58A5-4377-916D-9049F8FD685F}" dt="2018-03-30T10:49:47.921" v="385" actId="20577"/>
+      <pc:docMkLst>
+        <pc:docMk/>
+      </pc:docMkLst>
+      <pc:sldChg chg="modSp">
+        <pc:chgData name="Eugene CHOY Wen Jia" userId="f0093c6c-aad3-47c8-981f-e49faae5c851" providerId="ADAL" clId="{B65169D4-58A5-4377-916D-9049F8FD685F}" dt="2018-03-30T10:49:47.921" v="385" actId="20577"/>
+        <pc:sldMkLst>
+          <pc:docMk/>
+          <pc:sldMk cId="3129491093" sldId="261"/>
+        </pc:sldMkLst>
+        <pc:spChg chg="mod">
+          <ac:chgData name="Eugene CHOY Wen Jia" userId="f0093c6c-aad3-47c8-981f-e49faae5c851" providerId="ADAL" clId="{B65169D4-58A5-4377-916D-9049F8FD685F}" dt="2018-03-30T10:49:47.921" v="385" actId="20577"/>
+          <ac:spMkLst>
+            <pc:docMk/>
+            <pc:sldMk cId="3129491093" sldId="261"/>
+            <ac:spMk id="2" creationId="{88A8A327-822B-4D99-81ED-CB23238E4D54}"/>
+          </ac:spMkLst>
+        </pc:spChg>
+      </pc:sldChg>
+      <pc:sldChg chg="addSp delSp modSp">
+        <pc:chgData name="Eugene CHOY Wen Jia" userId="f0093c6c-aad3-47c8-981f-e49faae5c851" providerId="ADAL" clId="{B65169D4-58A5-4377-916D-9049F8FD685F}" dt="2018-03-30T10:32:02.066" v="362" actId="1076"/>
+        <pc:sldMkLst>
+          <pc:docMk/>
+          <pc:sldMk cId="1763506197" sldId="276"/>
+        </pc:sldMkLst>
+        <pc:spChg chg="add mod">
+          <ac:chgData name="Eugene CHOY Wen Jia" userId="f0093c6c-aad3-47c8-981f-e49faae5c851" providerId="ADAL" clId="{B65169D4-58A5-4377-916D-9049F8FD685F}" dt="2018-03-30T10:29:23.410" v="358" actId="1076"/>
+          <ac:spMkLst>
+            <pc:docMk/>
+            <pc:sldMk cId="1763506197" sldId="276"/>
+            <ac:spMk id="2" creationId="{92FEA579-8D88-40C4-834F-21E8DFFC029C}"/>
+          </ac:spMkLst>
+        </pc:spChg>
+        <pc:spChg chg="del mod">
+          <ac:chgData name="Eugene CHOY Wen Jia" userId="f0093c6c-aad3-47c8-981f-e49faae5c851" providerId="ADAL" clId="{B65169D4-58A5-4377-916D-9049F8FD685F}" dt="2018-03-30T10:23:58.037" v="177" actId="1076"/>
+          <ac:spMkLst>
+            <pc:docMk/>
+            <pc:sldMk cId="1763506197" sldId="276"/>
+            <ac:spMk id="5" creationId="{612B5993-4415-41FC-BB77-1979082721DC}"/>
+          </ac:spMkLst>
+        </pc:spChg>
+        <pc:spChg chg="add del mod">
+          <ac:chgData name="Eugene CHOY Wen Jia" userId="f0093c6c-aad3-47c8-981f-e49faae5c851" providerId="ADAL" clId="{B65169D4-58A5-4377-916D-9049F8FD685F}" dt="2018-03-30T10:27:56.292" v="193" actId="478"/>
+          <ac:spMkLst>
+            <pc:docMk/>
+            <pc:sldMk cId="1763506197" sldId="276"/>
+            <ac:spMk id="7" creationId="{DB4ACA99-0E4A-454D-84E1-33C38A961229}"/>
+          </ac:spMkLst>
+        </pc:spChg>
+        <pc:spChg chg="add mod">
+          <ac:chgData name="Eugene CHOY Wen Jia" userId="f0093c6c-aad3-47c8-981f-e49faae5c851" providerId="ADAL" clId="{B65169D4-58A5-4377-916D-9049F8FD685F}" dt="2018-03-30T10:29:23.410" v="358" actId="1076"/>
+          <ac:spMkLst>
+            <pc:docMk/>
+            <pc:sldMk cId="1763506197" sldId="276"/>
+            <ac:spMk id="9" creationId="{AA6DA0A2-BD2E-414B-9D82-E1A7CB0E0F71}"/>
+          </ac:spMkLst>
+        </pc:spChg>
+        <pc:spChg chg="add mod">
+          <ac:chgData name="Eugene CHOY Wen Jia" userId="f0093c6c-aad3-47c8-981f-e49faae5c851" providerId="ADAL" clId="{B65169D4-58A5-4377-916D-9049F8FD685F}" dt="2018-03-30T10:29:23.410" v="358" actId="1076"/>
+          <ac:spMkLst>
+            <pc:docMk/>
+            <pc:sldMk cId="1763506197" sldId="276"/>
+            <ac:spMk id="10" creationId="{BD91DEE8-58ED-4D41-AB72-2E59ACED9529}"/>
+          </ac:spMkLst>
+        </pc:spChg>
+        <pc:spChg chg="add mod">
+          <ac:chgData name="Eugene CHOY Wen Jia" userId="f0093c6c-aad3-47c8-981f-e49faae5c851" providerId="ADAL" clId="{B65169D4-58A5-4377-916D-9049F8FD685F}" dt="2018-03-30T10:29:23.410" v="358" actId="1076"/>
+          <ac:spMkLst>
+            <pc:docMk/>
+            <pc:sldMk cId="1763506197" sldId="276"/>
+            <ac:spMk id="11" creationId="{C9E731CC-F9DC-47AD-8498-10B6685FCF0F}"/>
+          </ac:spMkLst>
+        </pc:spChg>
+        <pc:picChg chg="add del mod">
+          <ac:chgData name="Eugene CHOY Wen Jia" userId="f0093c6c-aad3-47c8-981f-e49faae5c851" providerId="ADAL" clId="{B65169D4-58A5-4377-916D-9049F8FD685F}" dt="2018-03-30T10:27:36.356" v="186" actId="478"/>
+          <ac:picMkLst>
+            <pc:docMk/>
+            <pc:sldMk cId="1763506197" sldId="276"/>
+            <ac:picMk id="6" creationId="{ECB926F0-FA6C-4C5C-AEB3-BB48EBCF82E1}"/>
+          </ac:picMkLst>
+        </pc:picChg>
+        <pc:picChg chg="add mod ord">
+          <ac:chgData name="Eugene CHOY Wen Jia" userId="f0093c6c-aad3-47c8-981f-e49faae5c851" providerId="ADAL" clId="{B65169D4-58A5-4377-916D-9049F8FD685F}" dt="2018-03-30T10:29:23.410" v="358" actId="1076"/>
+          <ac:picMkLst>
+            <pc:docMk/>
+            <pc:sldMk cId="1763506197" sldId="276"/>
+            <ac:picMk id="8" creationId="{9D706A57-5873-46B6-AFEE-66A3B0213655}"/>
+          </ac:picMkLst>
+        </pc:picChg>
+        <pc:picChg chg="add mod">
+          <ac:chgData name="Eugene CHOY Wen Jia" userId="f0093c6c-aad3-47c8-981f-e49faae5c851" providerId="ADAL" clId="{B65169D4-58A5-4377-916D-9049F8FD685F}" dt="2018-03-30T10:32:02.066" v="362" actId="1076"/>
+          <ac:picMkLst>
+            <pc:docMk/>
+            <pc:sldMk cId="1763506197" sldId="276"/>
+            <ac:picMk id="12" creationId="{8321173F-7477-48E9-98C9-6AF6E0C18900}"/>
+          </ac:picMkLst>
+        </pc:picChg>
+      </pc:sldChg>
+      <pc:sldChg chg="addSp delSp modSp ord">
+        <pc:chgData name="Eugene CHOY Wen Jia" userId="f0093c6c-aad3-47c8-981f-e49faae5c851" providerId="ADAL" clId="{B65169D4-58A5-4377-916D-9049F8FD685F}" dt="2018-03-30T10:32:40.240" v="366" actId="1076"/>
+        <pc:sldMkLst>
+          <pc:docMk/>
+          <pc:sldMk cId="518247939" sldId="277"/>
+        </pc:sldMkLst>
+        <pc:spChg chg="del">
+          <ac:chgData name="Eugene CHOY Wen Jia" userId="f0093c6c-aad3-47c8-981f-e49faae5c851" providerId="ADAL" clId="{B65169D4-58A5-4377-916D-9049F8FD685F}" dt="2018-03-30T09:15:26.690" v="121" actId="478"/>
+          <ac:spMkLst>
+            <pc:docMk/>
+            <pc:sldMk cId="518247939" sldId="277"/>
+            <ac:spMk id="3" creationId="{4693C19A-DDF9-438D-A19B-4B14DD418721}"/>
+          </ac:spMkLst>
+        </pc:spChg>
+        <pc:spChg chg="add mod">
+          <ac:chgData name="Eugene CHOY Wen Jia" userId="f0093c6c-aad3-47c8-981f-e49faae5c851" providerId="ADAL" clId="{B65169D4-58A5-4377-916D-9049F8FD685F}" dt="2018-03-30T10:06:58.700" v="150" actId="208"/>
+          <ac:spMkLst>
+            <pc:docMk/>
+            <pc:sldMk cId="518247939" sldId="277"/>
+            <ac:spMk id="5" creationId="{688C200C-E783-43DC-8E9F-644944934EAF}"/>
+          </ac:spMkLst>
+        </pc:spChg>
+        <pc:spChg chg="add del">
+          <ac:chgData name="Eugene CHOY Wen Jia" userId="f0093c6c-aad3-47c8-981f-e49faae5c851" providerId="ADAL" clId="{B65169D4-58A5-4377-916D-9049F8FD685F}" dt="2018-03-30T10:05:53.168" v="137" actId="1076"/>
+          <ac:spMkLst>
+            <pc:docMk/>
+            <pc:sldMk cId="518247939" sldId="277"/>
+            <ac:spMk id="7" creationId="{0B1068C0-973E-4865-B179-4A5D7EE1F357}"/>
+          </ac:spMkLst>
+        </pc:spChg>
+        <pc:spChg chg="add mod">
+          <ac:chgData name="Eugene CHOY Wen Jia" userId="f0093c6c-aad3-47c8-981f-e49faae5c851" providerId="ADAL" clId="{B65169D4-58A5-4377-916D-9049F8FD685F}" dt="2018-03-30T10:06:58.700" v="150" actId="208"/>
+          <ac:spMkLst>
+            <pc:docMk/>
+            <pc:sldMk cId="518247939" sldId="277"/>
+            <ac:spMk id="8" creationId="{092F31A1-2CA8-469B-A6F0-B099C3D200F2}"/>
+          </ac:spMkLst>
+        </pc:spChg>
+        <pc:spChg chg="add mod">
+          <ac:chgData name="Eugene CHOY Wen Jia" userId="f0093c6c-aad3-47c8-981f-e49faae5c851" providerId="ADAL" clId="{B65169D4-58A5-4377-916D-9049F8FD685F}" dt="2018-03-30T10:07:53.442" v="175" actId="1076"/>
+          <ac:spMkLst>
+            <pc:docMk/>
+            <pc:sldMk cId="518247939" sldId="277"/>
+            <ac:spMk id="11" creationId="{8747C52C-D856-4D35-B65C-39137DBC57FC}"/>
+          </ac:spMkLst>
+        </pc:spChg>
+        <pc:spChg chg="add mod">
+          <ac:chgData name="Eugene CHOY Wen Jia" userId="f0093c6c-aad3-47c8-981f-e49faae5c851" providerId="ADAL" clId="{B65169D4-58A5-4377-916D-9049F8FD685F}" dt="2018-03-30T10:32:40.240" v="366" actId="1076"/>
+          <ac:spMkLst>
+            <pc:docMk/>
+            <pc:sldMk cId="518247939" sldId="277"/>
+            <ac:spMk id="12" creationId="{9BAD48DA-6D6F-4549-9A9F-A98C2C9FE73C}"/>
+          </ac:spMkLst>
+        </pc:spChg>
+        <pc:spChg chg="add mod">
+          <ac:chgData name="Eugene CHOY Wen Jia" userId="f0093c6c-aad3-47c8-981f-e49faae5c851" providerId="ADAL" clId="{B65169D4-58A5-4377-916D-9049F8FD685F}" dt="2018-03-30T10:32:32.971" v="365" actId="1076"/>
+          <ac:spMkLst>
+            <pc:docMk/>
+            <pc:sldMk cId="518247939" sldId="277"/>
+            <ac:spMk id="13" creationId="{2B48658C-50F3-4528-89FC-C2BB0AD6A630}"/>
+          </ac:spMkLst>
+        </pc:spChg>
+        <pc:picChg chg="add mod modCrop">
+          <ac:chgData name="Eugene CHOY Wen Jia" userId="f0093c6c-aad3-47c8-981f-e49faae5c851" providerId="ADAL" clId="{B65169D4-58A5-4377-916D-9049F8FD685F}" dt="2018-03-30T10:06:58.700" v="150" actId="208"/>
+          <ac:picMkLst>
+            <pc:docMk/>
+            <pc:sldMk cId="518247939" sldId="277"/>
+            <ac:picMk id="4" creationId="{0C25F157-AD76-4E14-8B68-DDF5966A4CC9}"/>
+          </ac:picMkLst>
+        </pc:picChg>
+        <pc:picChg chg="add mod">
+          <ac:chgData name="Eugene CHOY Wen Jia" userId="f0093c6c-aad3-47c8-981f-e49faae5c851" providerId="ADAL" clId="{B65169D4-58A5-4377-916D-9049F8FD685F}" dt="2018-03-30T10:02:33.451" v="133" actId="14100"/>
+          <ac:picMkLst>
+            <pc:docMk/>
+            <pc:sldMk cId="518247939" sldId="277"/>
+            <ac:picMk id="6" creationId="{E07969B6-E179-46E8-A084-CD28D721C64A}"/>
+          </ac:picMkLst>
+        </pc:picChg>
+        <pc:cxnChg chg="add mod">
+          <ac:chgData name="Eugene CHOY Wen Jia" userId="f0093c6c-aad3-47c8-981f-e49faae5c851" providerId="ADAL" clId="{B65169D4-58A5-4377-916D-9049F8FD685F}" dt="2018-03-30T10:07:10.445" v="151" actId="208"/>
+          <ac:cxnSpMkLst>
+            <pc:docMk/>
+            <pc:sldMk cId="518247939" sldId="277"/>
+            <ac:cxnSpMk id="10" creationId="{EE47AE5A-04DA-493A-9F4A-0F9B12606223}"/>
+          </ac:cxnSpMkLst>
+        </pc:cxnChg>
+      </pc:sldChg>
+      <pc:sldChg chg="addSp delSp modSp add ord">
+        <pc:chgData name="Eugene CHOY Wen Jia" userId="f0093c6c-aad3-47c8-981f-e49faae5c851" providerId="ADAL" clId="{B65169D4-58A5-4377-916D-9049F8FD685F}" dt="2018-03-30T09:10:14.083" v="68" actId="14100"/>
+        <pc:sldMkLst>
+          <pc:docMk/>
+          <pc:sldMk cId="2088767261" sldId="278"/>
+        </pc:sldMkLst>
+        <pc:spChg chg="mod">
+          <ac:chgData name="Eugene CHOY Wen Jia" userId="f0093c6c-aad3-47c8-981f-e49faae5c851" providerId="ADAL" clId="{B65169D4-58A5-4377-916D-9049F8FD685F}" dt="2018-03-30T09:05:14.311" v="8" actId="20577"/>
+          <ac:spMkLst>
+            <pc:docMk/>
+            <pc:sldMk cId="2088767261" sldId="278"/>
+            <ac:spMk id="2" creationId="{37FD307A-8AC0-4F40-A76C-38FD37BF20F8}"/>
+          </ac:spMkLst>
+        </pc:spChg>
+        <pc:spChg chg="del">
+          <ac:chgData name="Eugene CHOY Wen Jia" userId="f0093c6c-aad3-47c8-981f-e49faae5c851" providerId="ADAL" clId="{B65169D4-58A5-4377-916D-9049F8FD685F}" dt="2018-03-30T09:05:31.173" v="10" actId="478"/>
+          <ac:spMkLst>
+            <pc:docMk/>
+            <pc:sldMk cId="2088767261" sldId="278"/>
+            <ac:spMk id="3" creationId="{B0E596CC-AB04-4A2D-8C89-5BD27D6EB3DC}"/>
+          </ac:spMkLst>
+        </pc:spChg>
+        <pc:spChg chg="add mod">
+          <ac:chgData name="Eugene CHOY Wen Jia" userId="f0093c6c-aad3-47c8-981f-e49faae5c851" providerId="ADAL" clId="{B65169D4-58A5-4377-916D-9049F8FD685F}" dt="2018-03-30T09:08:25.407" v="46" actId="1076"/>
+          <ac:spMkLst>
+            <pc:docMk/>
+            <pc:sldMk cId="2088767261" sldId="278"/>
+            <ac:spMk id="5" creationId="{69F56EFE-EEA8-4B4D-972A-5BB8CBD33647}"/>
+          </ac:spMkLst>
+        </pc:spChg>
+        <pc:spChg chg="add mod">
+          <ac:chgData name="Eugene CHOY Wen Jia" userId="f0093c6c-aad3-47c8-981f-e49faae5c851" providerId="ADAL" clId="{B65169D4-58A5-4377-916D-9049F8FD685F}" dt="2018-03-30T09:10:06.704" v="67" actId="14100"/>
+          <ac:spMkLst>
+            <pc:docMk/>
+            <pc:sldMk cId="2088767261" sldId="278"/>
+            <ac:spMk id="6" creationId="{0B0FBA32-A551-4806-AB2D-D921D433BFD0}"/>
+          </ac:spMkLst>
+        </pc:spChg>
+        <pc:spChg chg="add mod">
+          <ac:chgData name="Eugene CHOY Wen Jia" userId="f0093c6c-aad3-47c8-981f-e49faae5c851" providerId="ADAL" clId="{B65169D4-58A5-4377-916D-9049F8FD685F}" dt="2018-03-30T09:10:14.083" v="68" actId="14100"/>
+          <ac:spMkLst>
+            <pc:docMk/>
+            <pc:sldMk cId="2088767261" sldId="278"/>
+            <ac:spMk id="8" creationId="{7FB6F554-892D-4400-8A2F-C40A04CA04FB}"/>
+          </ac:spMkLst>
+        </pc:spChg>
+        <pc:spChg chg="add mod">
+          <ac:chgData name="Eugene CHOY Wen Jia" userId="f0093c6c-aad3-47c8-981f-e49faae5c851" providerId="ADAL" clId="{B65169D4-58A5-4377-916D-9049F8FD685F}" dt="2018-03-30T09:09:57.877" v="66" actId="1076"/>
+          <ac:spMkLst>
+            <pc:docMk/>
+            <pc:sldMk cId="2088767261" sldId="278"/>
+            <ac:spMk id="9" creationId="{09987B6F-467F-4ECB-AE35-C3BD65DC41EB}"/>
+          </ac:spMkLst>
+        </pc:spChg>
+        <pc:picChg chg="add mod modCrop">
+          <ac:chgData name="Eugene CHOY Wen Jia" userId="f0093c6c-aad3-47c8-981f-e49faae5c851" providerId="ADAL" clId="{B65169D4-58A5-4377-916D-9049F8FD685F}" dt="2018-03-30T09:05:43.348" v="13" actId="732"/>
+          <ac:picMkLst>
+            <pc:docMk/>
+            <pc:sldMk cId="2088767261" sldId="278"/>
+            <ac:picMk id="4" creationId="{F6882C4E-75FC-4579-96FD-436239B98627}"/>
+          </ac:picMkLst>
+        </pc:picChg>
+        <pc:picChg chg="add mod modCrop">
+          <ac:chgData name="Eugene CHOY Wen Jia" userId="f0093c6c-aad3-47c8-981f-e49faae5c851" providerId="ADAL" clId="{B65169D4-58A5-4377-916D-9049F8FD685F}" dt="2018-03-30T09:08:36.461" v="47" actId="732"/>
+          <ac:picMkLst>
+            <pc:docMk/>
+            <pc:sldMk cId="2088767261" sldId="278"/>
+            <ac:picMk id="7" creationId="{EE15B64E-081E-4C23-B762-3EB354DE8CB8}"/>
+          </ac:picMkLst>
+        </pc:picChg>
+      </pc:sldChg>
+      <pc:sldChg chg="addSp delSp modSp add">
+        <pc:chgData name="Eugene CHOY Wen Jia" userId="f0093c6c-aad3-47c8-981f-e49faae5c851" providerId="ADAL" clId="{B65169D4-58A5-4377-916D-9049F8FD685F}" dt="2018-03-30T09:14:58.648" v="119" actId="1076"/>
+        <pc:sldMkLst>
+          <pc:docMk/>
+          <pc:sldMk cId="4267558421" sldId="279"/>
+        </pc:sldMkLst>
+        <pc:spChg chg="del">
+          <ac:chgData name="Eugene CHOY Wen Jia" userId="f0093c6c-aad3-47c8-981f-e49faae5c851" providerId="ADAL" clId="{B65169D4-58A5-4377-916D-9049F8FD685F}" dt="2018-03-30T09:11:57.501" v="72" actId="478"/>
+          <ac:spMkLst>
+            <pc:docMk/>
+            <pc:sldMk cId="4267558421" sldId="279"/>
+            <ac:spMk id="5" creationId="{69F56EFE-EEA8-4B4D-972A-5BB8CBD33647}"/>
+          </ac:spMkLst>
+        </pc:spChg>
+        <pc:spChg chg="del">
+          <ac:chgData name="Eugene CHOY Wen Jia" userId="f0093c6c-aad3-47c8-981f-e49faae5c851" providerId="ADAL" clId="{B65169D4-58A5-4377-916D-9049F8FD685F}" dt="2018-03-30T09:11:57.501" v="72" actId="478"/>
+          <ac:spMkLst>
+            <pc:docMk/>
+            <pc:sldMk cId="4267558421" sldId="279"/>
+            <ac:spMk id="6" creationId="{0B0FBA32-A551-4806-AB2D-D921D433BFD0}"/>
+          </ac:spMkLst>
+        </pc:spChg>
+        <pc:spChg chg="del">
+          <ac:chgData name="Eugene CHOY Wen Jia" userId="f0093c6c-aad3-47c8-981f-e49faae5c851" providerId="ADAL" clId="{B65169D4-58A5-4377-916D-9049F8FD685F}" dt="2018-03-30T09:13:58.738" v="97" actId="478"/>
+          <ac:spMkLst>
+            <pc:docMk/>
+            <pc:sldMk cId="4267558421" sldId="279"/>
+            <ac:spMk id="8" creationId="{7FB6F554-892D-4400-8A2F-C40A04CA04FB}"/>
+          </ac:spMkLst>
+        </pc:spChg>
+        <pc:spChg chg="mod">
+          <ac:chgData name="Eugene CHOY Wen Jia" userId="f0093c6c-aad3-47c8-981f-e49faae5c851" providerId="ADAL" clId="{B65169D4-58A5-4377-916D-9049F8FD685F}" dt="2018-03-30T09:12:26.876" v="89" actId="1076"/>
+          <ac:spMkLst>
+            <pc:docMk/>
+            <pc:sldMk cId="4267558421" sldId="279"/>
+            <ac:spMk id="9" creationId="{09987B6F-467F-4ECB-AE35-C3BD65DC41EB}"/>
+          </ac:spMkLst>
+        </pc:spChg>
+        <pc:spChg chg="add mod">
+          <ac:chgData name="Eugene CHOY Wen Jia" userId="f0093c6c-aad3-47c8-981f-e49faae5c851" providerId="ADAL" clId="{B65169D4-58A5-4377-916D-9049F8FD685F}" dt="2018-03-30T09:12:53.828" v="96" actId="14100"/>
+          <ac:spMkLst>
+            <pc:docMk/>
+            <pc:sldMk cId="4267558421" sldId="279"/>
+            <ac:spMk id="11" creationId="{4E158C6D-14E6-4678-8F20-291AE2B06ECB}"/>
+          </ac:spMkLst>
+        </pc:spChg>
+        <pc:spChg chg="add mod">
+          <ac:chgData name="Eugene CHOY Wen Jia" userId="f0093c6c-aad3-47c8-981f-e49faae5c851" providerId="ADAL" clId="{B65169D4-58A5-4377-916D-9049F8FD685F}" dt="2018-03-30T09:14:22.873" v="108" actId="20577"/>
+          <ac:spMkLst>
+            <pc:docMk/>
+            <pc:sldMk cId="4267558421" sldId="279"/>
+            <ac:spMk id="13" creationId="{195F7C3C-093E-45EB-909E-489CE6FFC402}"/>
+          </ac:spMkLst>
+        </pc:spChg>
+        <pc:spChg chg="add mod">
+          <ac:chgData name="Eugene CHOY Wen Jia" userId="f0093c6c-aad3-47c8-981f-e49faae5c851" providerId="ADAL" clId="{B65169D4-58A5-4377-916D-9049F8FD685F}" dt="2018-03-30T09:14:58.648" v="119" actId="1076"/>
+          <ac:spMkLst>
+            <pc:docMk/>
+            <pc:sldMk cId="4267558421" sldId="279"/>
+            <ac:spMk id="14" creationId="{6109AFCB-0F14-4A8D-A5EB-0AABBB587842}"/>
+          </ac:spMkLst>
+        </pc:spChg>
+        <pc:picChg chg="del">
+          <ac:chgData name="Eugene CHOY Wen Jia" userId="f0093c6c-aad3-47c8-981f-e49faae5c851" providerId="ADAL" clId="{B65169D4-58A5-4377-916D-9049F8FD685F}" dt="2018-03-30T09:11:57.501" v="72" actId="478"/>
+          <ac:picMkLst>
+            <pc:docMk/>
+            <pc:sldMk cId="4267558421" sldId="279"/>
+            <ac:picMk id="4" creationId="{F6882C4E-75FC-4579-96FD-436239B98627}"/>
+          </ac:picMkLst>
+        </pc:picChg>
+        <pc:picChg chg="add del">
+          <ac:chgData name="Eugene CHOY Wen Jia" userId="f0093c6c-aad3-47c8-981f-e49faae5c851" providerId="ADAL" clId="{B65169D4-58A5-4377-916D-9049F8FD685F}" dt="2018-03-30T09:12:06.917" v="75" actId="478"/>
+          <ac:picMkLst>
+            <pc:docMk/>
+            <pc:sldMk cId="4267558421" sldId="279"/>
+            <ac:picMk id="7" creationId="{EE15B64E-081E-4C23-B762-3EB354DE8CB8}"/>
+          </ac:picMkLst>
+        </pc:picChg>
+        <pc:picChg chg="add mod">
+          <ac:chgData name="Eugene CHOY Wen Jia" userId="f0093c6c-aad3-47c8-981f-e49faae5c851" providerId="ADAL" clId="{B65169D4-58A5-4377-916D-9049F8FD685F}" dt="2018-03-30T09:12:04.531" v="74" actId="1076"/>
+          <ac:picMkLst>
+            <pc:docMk/>
+            <pc:sldMk cId="4267558421" sldId="279"/>
+            <ac:picMk id="10" creationId="{AED48D7C-AFFA-4DD1-BB39-FBA01AF56AC3}"/>
+          </ac:picMkLst>
+        </pc:picChg>
+        <pc:picChg chg="add mod">
+          <ac:chgData name="Eugene CHOY Wen Jia" userId="f0093c6c-aad3-47c8-981f-e49faae5c851" providerId="ADAL" clId="{B65169D4-58A5-4377-916D-9049F8FD685F}" dt="2018-03-30T09:14:08.218" v="99" actId="1076"/>
+          <ac:picMkLst>
+            <pc:docMk/>
+            <pc:sldMk cId="4267558421" sldId="279"/>
+            <ac:picMk id="12" creationId="{9EB3F8CA-A722-4976-A15D-221B9C25224E}"/>
+          </ac:picMkLst>
+        </pc:picChg>
+      </pc:sldChg>
+    </pc:docChg>
+  </pc:docChgLst>
   <pc:docChgLst>
     <pc:chgData name=" " userId="f0093c6c-aad3-47c8-981f-e49faae5c851" providerId="ADAL" clId="{3552CE5B-0803-49BD-A011-F4C75B92F40C}"/>
     <pc:docChg chg="undo custSel addSld delSld modSld sldOrd modMainMaster">
@@ -373,362 +729,6 @@
     </pc:docChg>
   </pc:docChgLst>
   <pc:docChgLst>
-    <pc:chgData name="Eugene CHOY Wen Jia" userId="f0093c6c-aad3-47c8-981f-e49faae5c851" providerId="ADAL" clId="{B65169D4-58A5-4377-916D-9049F8FD685F}"/>
-    <pc:docChg chg="undo custSel addSld modSld sldOrd">
-      <pc:chgData name="Eugene CHOY Wen Jia" userId="f0093c6c-aad3-47c8-981f-e49faae5c851" providerId="ADAL" clId="{B65169D4-58A5-4377-916D-9049F8FD685F}" dt="2018-03-30T10:49:47.921" v="385" actId="20577"/>
-      <pc:docMkLst>
-        <pc:docMk/>
-      </pc:docMkLst>
-      <pc:sldChg chg="modSp">
-        <pc:chgData name="Eugene CHOY Wen Jia" userId="f0093c6c-aad3-47c8-981f-e49faae5c851" providerId="ADAL" clId="{B65169D4-58A5-4377-916D-9049F8FD685F}" dt="2018-03-30T10:49:47.921" v="385" actId="20577"/>
-        <pc:sldMkLst>
-          <pc:docMk/>
-          <pc:sldMk cId="3129491093" sldId="261"/>
-        </pc:sldMkLst>
-        <pc:spChg chg="mod">
-          <ac:chgData name="Eugene CHOY Wen Jia" userId="f0093c6c-aad3-47c8-981f-e49faae5c851" providerId="ADAL" clId="{B65169D4-58A5-4377-916D-9049F8FD685F}" dt="2018-03-30T10:49:47.921" v="385" actId="20577"/>
-          <ac:spMkLst>
-            <pc:docMk/>
-            <pc:sldMk cId="3129491093" sldId="261"/>
-            <ac:spMk id="2" creationId="{88A8A327-822B-4D99-81ED-CB23238E4D54}"/>
-          </ac:spMkLst>
-        </pc:spChg>
-      </pc:sldChg>
-      <pc:sldChg chg="addSp delSp modSp">
-        <pc:chgData name="Eugene CHOY Wen Jia" userId="f0093c6c-aad3-47c8-981f-e49faae5c851" providerId="ADAL" clId="{B65169D4-58A5-4377-916D-9049F8FD685F}" dt="2018-03-30T10:32:02.066" v="362" actId="1076"/>
-        <pc:sldMkLst>
-          <pc:docMk/>
-          <pc:sldMk cId="1763506197" sldId="276"/>
-        </pc:sldMkLst>
-        <pc:spChg chg="add mod">
-          <ac:chgData name="Eugene CHOY Wen Jia" userId="f0093c6c-aad3-47c8-981f-e49faae5c851" providerId="ADAL" clId="{B65169D4-58A5-4377-916D-9049F8FD685F}" dt="2018-03-30T10:29:23.410" v="358" actId="1076"/>
-          <ac:spMkLst>
-            <pc:docMk/>
-            <pc:sldMk cId="1763506197" sldId="276"/>
-            <ac:spMk id="2" creationId="{92FEA579-8D88-40C4-834F-21E8DFFC029C}"/>
-          </ac:spMkLst>
-        </pc:spChg>
-        <pc:spChg chg="del mod">
-          <ac:chgData name="Eugene CHOY Wen Jia" userId="f0093c6c-aad3-47c8-981f-e49faae5c851" providerId="ADAL" clId="{B65169D4-58A5-4377-916D-9049F8FD685F}" dt="2018-03-30T10:23:58.037" v="177"/>
-          <ac:spMkLst>
-            <pc:docMk/>
-            <pc:sldMk cId="1763506197" sldId="276"/>
-            <ac:spMk id="5" creationId="{612B5993-4415-41FC-BB77-1979082721DC}"/>
-          </ac:spMkLst>
-        </pc:spChg>
-        <pc:spChg chg="add del mod">
-          <ac:chgData name="Eugene CHOY Wen Jia" userId="f0093c6c-aad3-47c8-981f-e49faae5c851" providerId="ADAL" clId="{B65169D4-58A5-4377-916D-9049F8FD685F}" dt="2018-03-30T10:27:56.292" v="193" actId="478"/>
-          <ac:spMkLst>
-            <pc:docMk/>
-            <pc:sldMk cId="1763506197" sldId="276"/>
-            <ac:spMk id="7" creationId="{DB4ACA99-0E4A-454D-84E1-33C38A961229}"/>
-          </ac:spMkLst>
-        </pc:spChg>
-        <pc:spChg chg="add mod">
-          <ac:chgData name="Eugene CHOY Wen Jia" userId="f0093c6c-aad3-47c8-981f-e49faae5c851" providerId="ADAL" clId="{B65169D4-58A5-4377-916D-9049F8FD685F}" dt="2018-03-30T10:29:23.410" v="358" actId="1076"/>
-          <ac:spMkLst>
-            <pc:docMk/>
-            <pc:sldMk cId="1763506197" sldId="276"/>
-            <ac:spMk id="9" creationId="{AA6DA0A2-BD2E-414B-9D82-E1A7CB0E0F71}"/>
-          </ac:spMkLst>
-        </pc:spChg>
-        <pc:spChg chg="add mod">
-          <ac:chgData name="Eugene CHOY Wen Jia" userId="f0093c6c-aad3-47c8-981f-e49faae5c851" providerId="ADAL" clId="{B65169D4-58A5-4377-916D-9049F8FD685F}" dt="2018-03-30T10:29:23.410" v="358" actId="1076"/>
-          <ac:spMkLst>
-            <pc:docMk/>
-            <pc:sldMk cId="1763506197" sldId="276"/>
-            <ac:spMk id="10" creationId="{BD91DEE8-58ED-4D41-AB72-2E59ACED9529}"/>
-          </ac:spMkLst>
-        </pc:spChg>
-        <pc:spChg chg="add mod">
-          <ac:chgData name="Eugene CHOY Wen Jia" userId="f0093c6c-aad3-47c8-981f-e49faae5c851" providerId="ADAL" clId="{B65169D4-58A5-4377-916D-9049F8FD685F}" dt="2018-03-30T10:29:23.410" v="358" actId="1076"/>
-          <ac:spMkLst>
-            <pc:docMk/>
-            <pc:sldMk cId="1763506197" sldId="276"/>
-            <ac:spMk id="11" creationId="{C9E731CC-F9DC-47AD-8498-10B6685FCF0F}"/>
-          </ac:spMkLst>
-        </pc:spChg>
-        <pc:picChg chg="add del mod">
-          <ac:chgData name="Eugene CHOY Wen Jia" userId="f0093c6c-aad3-47c8-981f-e49faae5c851" providerId="ADAL" clId="{B65169D4-58A5-4377-916D-9049F8FD685F}" dt="2018-03-30T10:27:36.356" v="186" actId="478"/>
-          <ac:picMkLst>
-            <pc:docMk/>
-            <pc:sldMk cId="1763506197" sldId="276"/>
-            <ac:picMk id="6" creationId="{ECB926F0-FA6C-4C5C-AEB3-BB48EBCF82E1}"/>
-          </ac:picMkLst>
-        </pc:picChg>
-        <pc:picChg chg="add mod ord">
-          <ac:chgData name="Eugene CHOY Wen Jia" userId="f0093c6c-aad3-47c8-981f-e49faae5c851" providerId="ADAL" clId="{B65169D4-58A5-4377-916D-9049F8FD685F}" dt="2018-03-30T10:29:23.410" v="358" actId="1076"/>
-          <ac:picMkLst>
-            <pc:docMk/>
-            <pc:sldMk cId="1763506197" sldId="276"/>
-            <ac:picMk id="8" creationId="{9D706A57-5873-46B6-AFEE-66A3B0213655}"/>
-          </ac:picMkLst>
-        </pc:picChg>
-        <pc:picChg chg="add mod">
-          <ac:chgData name="Eugene CHOY Wen Jia" userId="f0093c6c-aad3-47c8-981f-e49faae5c851" providerId="ADAL" clId="{B65169D4-58A5-4377-916D-9049F8FD685F}" dt="2018-03-30T10:32:02.066" v="362" actId="1076"/>
-          <ac:picMkLst>
-            <pc:docMk/>
-            <pc:sldMk cId="1763506197" sldId="276"/>
-            <ac:picMk id="12" creationId="{8321173F-7477-48E9-98C9-6AF6E0C18900}"/>
-          </ac:picMkLst>
-        </pc:picChg>
-      </pc:sldChg>
-      <pc:sldChg chg="addSp delSp modSp ord">
-        <pc:chgData name="Eugene CHOY Wen Jia" userId="f0093c6c-aad3-47c8-981f-e49faae5c851" providerId="ADAL" clId="{B65169D4-58A5-4377-916D-9049F8FD685F}" dt="2018-03-30T10:32:40.240" v="366" actId="1076"/>
-        <pc:sldMkLst>
-          <pc:docMk/>
-          <pc:sldMk cId="518247939" sldId="277"/>
-        </pc:sldMkLst>
-        <pc:spChg chg="del">
-          <ac:chgData name="Eugene CHOY Wen Jia" userId="f0093c6c-aad3-47c8-981f-e49faae5c851" providerId="ADAL" clId="{B65169D4-58A5-4377-916D-9049F8FD685F}" dt="2018-03-30T09:15:26.690" v="121" actId="478"/>
-          <ac:spMkLst>
-            <pc:docMk/>
-            <pc:sldMk cId="518247939" sldId="277"/>
-            <ac:spMk id="3" creationId="{4693C19A-DDF9-438D-A19B-4B14DD418721}"/>
-          </ac:spMkLst>
-        </pc:spChg>
-        <pc:spChg chg="add mod">
-          <ac:chgData name="Eugene CHOY Wen Jia" userId="f0093c6c-aad3-47c8-981f-e49faae5c851" providerId="ADAL" clId="{B65169D4-58A5-4377-916D-9049F8FD685F}" dt="2018-03-30T10:06:58.700" v="150" actId="208"/>
-          <ac:spMkLst>
-            <pc:docMk/>
-            <pc:sldMk cId="518247939" sldId="277"/>
-            <ac:spMk id="5" creationId="{688C200C-E783-43DC-8E9F-644944934EAF}"/>
-          </ac:spMkLst>
-        </pc:spChg>
-        <pc:spChg chg="add del">
-          <ac:chgData name="Eugene CHOY Wen Jia" userId="f0093c6c-aad3-47c8-981f-e49faae5c851" providerId="ADAL" clId="{B65169D4-58A5-4377-916D-9049F8FD685F}" dt="2018-03-30T10:05:53.168" v="137"/>
-          <ac:spMkLst>
-            <pc:docMk/>
-            <pc:sldMk cId="518247939" sldId="277"/>
-            <ac:spMk id="7" creationId="{0B1068C0-973E-4865-B179-4A5D7EE1F357}"/>
-          </ac:spMkLst>
-        </pc:spChg>
-        <pc:spChg chg="add mod">
-          <ac:chgData name="Eugene CHOY Wen Jia" userId="f0093c6c-aad3-47c8-981f-e49faae5c851" providerId="ADAL" clId="{B65169D4-58A5-4377-916D-9049F8FD685F}" dt="2018-03-30T10:06:58.700" v="150" actId="208"/>
-          <ac:spMkLst>
-            <pc:docMk/>
-            <pc:sldMk cId="518247939" sldId="277"/>
-            <ac:spMk id="8" creationId="{092F31A1-2CA8-469B-A6F0-B099C3D200F2}"/>
-          </ac:spMkLst>
-        </pc:spChg>
-        <pc:spChg chg="add mod">
-          <ac:chgData name="Eugene CHOY Wen Jia" userId="f0093c6c-aad3-47c8-981f-e49faae5c851" providerId="ADAL" clId="{B65169D4-58A5-4377-916D-9049F8FD685F}" dt="2018-03-30T10:07:53.442" v="175" actId="1076"/>
-          <ac:spMkLst>
-            <pc:docMk/>
-            <pc:sldMk cId="518247939" sldId="277"/>
-            <ac:spMk id="11" creationId="{8747C52C-D856-4D35-B65C-39137DBC57FC}"/>
-          </ac:spMkLst>
-        </pc:spChg>
-        <pc:spChg chg="add mod">
-          <ac:chgData name="Eugene CHOY Wen Jia" userId="f0093c6c-aad3-47c8-981f-e49faae5c851" providerId="ADAL" clId="{B65169D4-58A5-4377-916D-9049F8FD685F}" dt="2018-03-30T10:32:40.240" v="366" actId="1076"/>
-          <ac:spMkLst>
-            <pc:docMk/>
-            <pc:sldMk cId="518247939" sldId="277"/>
-            <ac:spMk id="12" creationId="{9BAD48DA-6D6F-4549-9A9F-A98C2C9FE73C}"/>
-          </ac:spMkLst>
-        </pc:spChg>
-        <pc:spChg chg="add mod">
-          <ac:chgData name="Eugene CHOY Wen Jia" userId="f0093c6c-aad3-47c8-981f-e49faae5c851" providerId="ADAL" clId="{B65169D4-58A5-4377-916D-9049F8FD685F}" dt="2018-03-30T10:32:32.971" v="365" actId="1076"/>
-          <ac:spMkLst>
-            <pc:docMk/>
-            <pc:sldMk cId="518247939" sldId="277"/>
-            <ac:spMk id="13" creationId="{2B48658C-50F3-4528-89FC-C2BB0AD6A630}"/>
-          </ac:spMkLst>
-        </pc:spChg>
-        <pc:picChg chg="add mod modCrop">
-          <ac:chgData name="Eugene CHOY Wen Jia" userId="f0093c6c-aad3-47c8-981f-e49faae5c851" providerId="ADAL" clId="{B65169D4-58A5-4377-916D-9049F8FD685F}" dt="2018-03-30T10:06:58.700" v="150" actId="208"/>
-          <ac:picMkLst>
-            <pc:docMk/>
-            <pc:sldMk cId="518247939" sldId="277"/>
-            <ac:picMk id="4" creationId="{0C25F157-AD76-4E14-8B68-DDF5966A4CC9}"/>
-          </ac:picMkLst>
-        </pc:picChg>
-        <pc:picChg chg="add mod">
-          <ac:chgData name="Eugene CHOY Wen Jia" userId="f0093c6c-aad3-47c8-981f-e49faae5c851" providerId="ADAL" clId="{B65169D4-58A5-4377-916D-9049F8FD685F}" dt="2018-03-30T10:02:33.451" v="133" actId="14100"/>
-          <ac:picMkLst>
-            <pc:docMk/>
-            <pc:sldMk cId="518247939" sldId="277"/>
-            <ac:picMk id="6" creationId="{E07969B6-E179-46E8-A084-CD28D721C64A}"/>
-          </ac:picMkLst>
-        </pc:picChg>
-        <pc:cxnChg chg="add mod">
-          <ac:chgData name="Eugene CHOY Wen Jia" userId="f0093c6c-aad3-47c8-981f-e49faae5c851" providerId="ADAL" clId="{B65169D4-58A5-4377-916D-9049F8FD685F}" dt="2018-03-30T10:07:10.445" v="151" actId="208"/>
-          <ac:cxnSpMkLst>
-            <pc:docMk/>
-            <pc:sldMk cId="518247939" sldId="277"/>
-            <ac:cxnSpMk id="10" creationId="{EE47AE5A-04DA-493A-9F4A-0F9B12606223}"/>
-          </ac:cxnSpMkLst>
-        </pc:cxnChg>
-      </pc:sldChg>
-      <pc:sldChg chg="addSp delSp modSp add ord">
-        <pc:chgData name="Eugene CHOY Wen Jia" userId="f0093c6c-aad3-47c8-981f-e49faae5c851" providerId="ADAL" clId="{B65169D4-58A5-4377-916D-9049F8FD685F}" dt="2018-03-30T09:10:14.083" v="68" actId="14100"/>
-        <pc:sldMkLst>
-          <pc:docMk/>
-          <pc:sldMk cId="2088767261" sldId="278"/>
-        </pc:sldMkLst>
-        <pc:spChg chg="mod">
-          <ac:chgData name="Eugene CHOY Wen Jia" userId="f0093c6c-aad3-47c8-981f-e49faae5c851" providerId="ADAL" clId="{B65169D4-58A5-4377-916D-9049F8FD685F}" dt="2018-03-30T09:05:14.311" v="8" actId="20577"/>
-          <ac:spMkLst>
-            <pc:docMk/>
-            <pc:sldMk cId="2088767261" sldId="278"/>
-            <ac:spMk id="2" creationId="{37FD307A-8AC0-4F40-A76C-38FD37BF20F8}"/>
-          </ac:spMkLst>
-        </pc:spChg>
-        <pc:spChg chg="del">
-          <ac:chgData name="Eugene CHOY Wen Jia" userId="f0093c6c-aad3-47c8-981f-e49faae5c851" providerId="ADAL" clId="{B65169D4-58A5-4377-916D-9049F8FD685F}" dt="2018-03-30T09:05:31.173" v="10" actId="478"/>
-          <ac:spMkLst>
-            <pc:docMk/>
-            <pc:sldMk cId="2088767261" sldId="278"/>
-            <ac:spMk id="3" creationId="{B0E596CC-AB04-4A2D-8C89-5BD27D6EB3DC}"/>
-          </ac:spMkLst>
-        </pc:spChg>
-        <pc:spChg chg="add mod">
-          <ac:chgData name="Eugene CHOY Wen Jia" userId="f0093c6c-aad3-47c8-981f-e49faae5c851" providerId="ADAL" clId="{B65169D4-58A5-4377-916D-9049F8FD685F}" dt="2018-03-30T09:08:25.407" v="46" actId="1076"/>
-          <ac:spMkLst>
-            <pc:docMk/>
-            <pc:sldMk cId="2088767261" sldId="278"/>
-            <ac:spMk id="5" creationId="{69F56EFE-EEA8-4B4D-972A-5BB8CBD33647}"/>
-          </ac:spMkLst>
-        </pc:spChg>
-        <pc:spChg chg="add mod">
-          <ac:chgData name="Eugene CHOY Wen Jia" userId="f0093c6c-aad3-47c8-981f-e49faae5c851" providerId="ADAL" clId="{B65169D4-58A5-4377-916D-9049F8FD685F}" dt="2018-03-30T09:10:06.704" v="67" actId="14100"/>
-          <ac:spMkLst>
-            <pc:docMk/>
-            <pc:sldMk cId="2088767261" sldId="278"/>
-            <ac:spMk id="6" creationId="{0B0FBA32-A551-4806-AB2D-D921D433BFD0}"/>
-          </ac:spMkLst>
-        </pc:spChg>
-        <pc:spChg chg="add mod">
-          <ac:chgData name="Eugene CHOY Wen Jia" userId="f0093c6c-aad3-47c8-981f-e49faae5c851" providerId="ADAL" clId="{B65169D4-58A5-4377-916D-9049F8FD685F}" dt="2018-03-30T09:10:14.083" v="68" actId="14100"/>
-          <ac:spMkLst>
-            <pc:docMk/>
-            <pc:sldMk cId="2088767261" sldId="278"/>
-            <ac:spMk id="8" creationId="{7FB6F554-892D-4400-8A2F-C40A04CA04FB}"/>
-          </ac:spMkLst>
-        </pc:spChg>
-        <pc:spChg chg="add mod">
-          <ac:chgData name="Eugene CHOY Wen Jia" userId="f0093c6c-aad3-47c8-981f-e49faae5c851" providerId="ADAL" clId="{B65169D4-58A5-4377-916D-9049F8FD685F}" dt="2018-03-30T09:09:57.877" v="66" actId="1076"/>
-          <ac:spMkLst>
-            <pc:docMk/>
-            <pc:sldMk cId="2088767261" sldId="278"/>
-            <ac:spMk id="9" creationId="{09987B6F-467F-4ECB-AE35-C3BD65DC41EB}"/>
-          </ac:spMkLst>
-        </pc:spChg>
-        <pc:picChg chg="add mod modCrop">
-          <ac:chgData name="Eugene CHOY Wen Jia" userId="f0093c6c-aad3-47c8-981f-e49faae5c851" providerId="ADAL" clId="{B65169D4-58A5-4377-916D-9049F8FD685F}" dt="2018-03-30T09:05:43.348" v="13" actId="732"/>
-          <ac:picMkLst>
-            <pc:docMk/>
-            <pc:sldMk cId="2088767261" sldId="278"/>
-            <ac:picMk id="4" creationId="{F6882C4E-75FC-4579-96FD-436239B98627}"/>
-          </ac:picMkLst>
-        </pc:picChg>
-        <pc:picChg chg="add mod modCrop">
-          <ac:chgData name="Eugene CHOY Wen Jia" userId="f0093c6c-aad3-47c8-981f-e49faae5c851" providerId="ADAL" clId="{B65169D4-58A5-4377-916D-9049F8FD685F}" dt="2018-03-30T09:08:36.461" v="47" actId="732"/>
-          <ac:picMkLst>
-            <pc:docMk/>
-            <pc:sldMk cId="2088767261" sldId="278"/>
-            <ac:picMk id="7" creationId="{EE15B64E-081E-4C23-B762-3EB354DE8CB8}"/>
-          </ac:picMkLst>
-        </pc:picChg>
-      </pc:sldChg>
-      <pc:sldChg chg="addSp delSp modSp add">
-        <pc:chgData name="Eugene CHOY Wen Jia" userId="f0093c6c-aad3-47c8-981f-e49faae5c851" providerId="ADAL" clId="{B65169D4-58A5-4377-916D-9049F8FD685F}" dt="2018-03-30T09:14:58.648" v="119" actId="1076"/>
-        <pc:sldMkLst>
-          <pc:docMk/>
-          <pc:sldMk cId="4267558421" sldId="279"/>
-        </pc:sldMkLst>
-        <pc:spChg chg="del">
-          <ac:chgData name="Eugene CHOY Wen Jia" userId="f0093c6c-aad3-47c8-981f-e49faae5c851" providerId="ADAL" clId="{B65169D4-58A5-4377-916D-9049F8FD685F}" dt="2018-03-30T09:11:57.501" v="72" actId="478"/>
-          <ac:spMkLst>
-            <pc:docMk/>
-            <pc:sldMk cId="4267558421" sldId="279"/>
-            <ac:spMk id="5" creationId="{69F56EFE-EEA8-4B4D-972A-5BB8CBD33647}"/>
-          </ac:spMkLst>
-        </pc:spChg>
-        <pc:spChg chg="del">
-          <ac:chgData name="Eugene CHOY Wen Jia" userId="f0093c6c-aad3-47c8-981f-e49faae5c851" providerId="ADAL" clId="{B65169D4-58A5-4377-916D-9049F8FD685F}" dt="2018-03-30T09:11:57.501" v="72" actId="478"/>
-          <ac:spMkLst>
-            <pc:docMk/>
-            <pc:sldMk cId="4267558421" sldId="279"/>
-            <ac:spMk id="6" creationId="{0B0FBA32-A551-4806-AB2D-D921D433BFD0}"/>
-          </ac:spMkLst>
-        </pc:spChg>
-        <pc:spChg chg="del">
-          <ac:chgData name="Eugene CHOY Wen Jia" userId="f0093c6c-aad3-47c8-981f-e49faae5c851" providerId="ADAL" clId="{B65169D4-58A5-4377-916D-9049F8FD685F}" dt="2018-03-30T09:13:58.738" v="97" actId="478"/>
-          <ac:spMkLst>
-            <pc:docMk/>
-            <pc:sldMk cId="4267558421" sldId="279"/>
-            <ac:spMk id="8" creationId="{7FB6F554-892D-4400-8A2F-C40A04CA04FB}"/>
-          </ac:spMkLst>
-        </pc:spChg>
-        <pc:spChg chg="mod">
-          <ac:chgData name="Eugene CHOY Wen Jia" userId="f0093c6c-aad3-47c8-981f-e49faae5c851" providerId="ADAL" clId="{B65169D4-58A5-4377-916D-9049F8FD685F}" dt="2018-03-30T09:12:26.876" v="89" actId="1076"/>
-          <ac:spMkLst>
-            <pc:docMk/>
-            <pc:sldMk cId="4267558421" sldId="279"/>
-            <ac:spMk id="9" creationId="{09987B6F-467F-4ECB-AE35-C3BD65DC41EB}"/>
-          </ac:spMkLst>
-        </pc:spChg>
-        <pc:spChg chg="add mod">
-          <ac:chgData name="Eugene CHOY Wen Jia" userId="f0093c6c-aad3-47c8-981f-e49faae5c851" providerId="ADAL" clId="{B65169D4-58A5-4377-916D-9049F8FD685F}" dt="2018-03-30T09:12:53.828" v="96" actId="14100"/>
-          <ac:spMkLst>
-            <pc:docMk/>
-            <pc:sldMk cId="4267558421" sldId="279"/>
-            <ac:spMk id="11" creationId="{4E158C6D-14E6-4678-8F20-291AE2B06ECB}"/>
-          </ac:spMkLst>
-        </pc:spChg>
-        <pc:spChg chg="add mod">
-          <ac:chgData name="Eugene CHOY Wen Jia" userId="f0093c6c-aad3-47c8-981f-e49faae5c851" providerId="ADAL" clId="{B65169D4-58A5-4377-916D-9049F8FD685F}" dt="2018-03-30T09:14:22.873" v="108" actId="20577"/>
-          <ac:spMkLst>
-            <pc:docMk/>
-            <pc:sldMk cId="4267558421" sldId="279"/>
-            <ac:spMk id="13" creationId="{195F7C3C-093E-45EB-909E-489CE6FFC402}"/>
-          </ac:spMkLst>
-        </pc:spChg>
-        <pc:spChg chg="add mod">
-          <ac:chgData name="Eugene CHOY Wen Jia" userId="f0093c6c-aad3-47c8-981f-e49faae5c851" providerId="ADAL" clId="{B65169D4-58A5-4377-916D-9049F8FD685F}" dt="2018-03-30T09:14:58.648" v="119" actId="1076"/>
-          <ac:spMkLst>
-            <pc:docMk/>
-            <pc:sldMk cId="4267558421" sldId="279"/>
-            <ac:spMk id="14" creationId="{6109AFCB-0F14-4A8D-A5EB-0AABBB587842}"/>
-          </ac:spMkLst>
-        </pc:spChg>
-        <pc:picChg chg="del">
-          <ac:chgData name="Eugene CHOY Wen Jia" userId="f0093c6c-aad3-47c8-981f-e49faae5c851" providerId="ADAL" clId="{B65169D4-58A5-4377-916D-9049F8FD685F}" dt="2018-03-30T09:11:57.501" v="72" actId="478"/>
-          <ac:picMkLst>
-            <pc:docMk/>
-            <pc:sldMk cId="4267558421" sldId="279"/>
-            <ac:picMk id="4" creationId="{F6882C4E-75FC-4579-96FD-436239B98627}"/>
-          </ac:picMkLst>
-        </pc:picChg>
-        <pc:picChg chg="add del">
-          <ac:chgData name="Eugene CHOY Wen Jia" userId="f0093c6c-aad3-47c8-981f-e49faae5c851" providerId="ADAL" clId="{B65169D4-58A5-4377-916D-9049F8FD685F}" dt="2018-03-30T09:12:06.917" v="75" actId="478"/>
-          <ac:picMkLst>
-            <pc:docMk/>
-            <pc:sldMk cId="4267558421" sldId="279"/>
-            <ac:picMk id="7" creationId="{EE15B64E-081E-4C23-B762-3EB354DE8CB8}"/>
-          </ac:picMkLst>
-        </pc:picChg>
-        <pc:picChg chg="add mod">
-          <ac:chgData name="Eugene CHOY Wen Jia" userId="f0093c6c-aad3-47c8-981f-e49faae5c851" providerId="ADAL" clId="{B65169D4-58A5-4377-916D-9049F8FD685F}" dt="2018-03-30T09:12:04.531" v="74" actId="1076"/>
-          <ac:picMkLst>
-            <pc:docMk/>
-            <pc:sldMk cId="4267558421" sldId="279"/>
-            <ac:picMk id="10" creationId="{AED48D7C-AFFA-4DD1-BB39-FBA01AF56AC3}"/>
-          </ac:picMkLst>
-        </pc:picChg>
-        <pc:picChg chg="add mod">
-          <ac:chgData name="Eugene CHOY Wen Jia" userId="f0093c6c-aad3-47c8-981f-e49faae5c851" providerId="ADAL" clId="{B65169D4-58A5-4377-916D-9049F8FD685F}" dt="2018-03-30T09:14:08.218" v="99" actId="1076"/>
-          <ac:picMkLst>
-            <pc:docMk/>
-            <pc:sldMk cId="4267558421" sldId="279"/>
-            <ac:picMk id="12" creationId="{9EB3F8CA-A722-4976-A15D-221B9C25224E}"/>
-          </ac:picMkLst>
-        </pc:picChg>
-      </pc:sldChg>
-    </pc:docChg>
-  </pc:docChgLst>
-  <pc:docChgLst>
     <pc:chgData name="Eugene CHOY Wen Jia" userId="f0093c6c-aad3-47c8-981f-e49faae5c851" providerId="ADAL" clId="{3552CE5B-0803-49BD-A011-F4C75B92F40C}"/>
     <pc:docChg chg="undo custSel modSld">
       <pc:chgData name="Eugene CHOY Wen Jia" userId="f0093c6c-aad3-47c8-981f-e49faae5c851" providerId="ADAL" clId="{3552CE5B-0803-49BD-A011-F4C75B92F40C}" dt="2018-03-20T07:13:31.677" v="321" actId="1076"/>
@@ -822,7 +822,7 @@
           <a:p>
             <a:fld id="{2969D29A-BED7-4F52-827A-C7D8A439955D}" type="datetimeFigureOut">
               <a:rPr lang="en-US" smtClean="0"/>
-              <a:t>30-Mar-18</a:t>
+              <a:t>3/31/2018</a:t>
             </a:fld>
             <a:endParaRPr lang="en-US"/>
           </a:p>
@@ -1572,7 +1572,7 @@
           <a:p>
             <a:fld id="{4C7F959B-C76D-4575-9470-CE5E6063DE88}" type="datetimeFigureOut">
               <a:rPr lang="en-US" smtClean="0"/>
-              <a:t>30-Mar-18</a:t>
+              <a:t>3/31/2018</a:t>
             </a:fld>
             <a:endParaRPr lang="en-US"/>
           </a:p>
@@ -1782,7 +1782,7 @@
           <a:p>
             <a:fld id="{4C7F959B-C76D-4575-9470-CE5E6063DE88}" type="datetimeFigureOut">
               <a:rPr lang="en-US" smtClean="0"/>
-              <a:t>30-Mar-18</a:t>
+              <a:t>3/31/2018</a:t>
             </a:fld>
             <a:endParaRPr lang="en-US"/>
           </a:p>
@@ -2002,7 +2002,7 @@
           <a:p>
             <a:fld id="{4C7F959B-C76D-4575-9470-CE5E6063DE88}" type="datetimeFigureOut">
               <a:rPr lang="en-US" smtClean="0"/>
-              <a:t>30-Mar-18</a:t>
+              <a:t>3/31/2018</a:t>
             </a:fld>
             <a:endParaRPr lang="en-US"/>
           </a:p>
@@ -2212,7 +2212,7 @@
           <a:p>
             <a:fld id="{4C7F959B-C76D-4575-9470-CE5E6063DE88}" type="datetimeFigureOut">
               <a:rPr lang="en-US" smtClean="0"/>
-              <a:t>30-Mar-18</a:t>
+              <a:t>3/31/2018</a:t>
             </a:fld>
             <a:endParaRPr lang="en-US"/>
           </a:p>
@@ -2499,7 +2499,7 @@
           <a:p>
             <a:fld id="{4C7F959B-C76D-4575-9470-CE5E6063DE88}" type="datetimeFigureOut">
               <a:rPr lang="en-US" smtClean="0"/>
-              <a:t>30-Mar-18</a:t>
+              <a:t>3/31/2018</a:t>
             </a:fld>
             <a:endParaRPr lang="en-US"/>
           </a:p>
@@ -2776,7 +2776,7 @@
           <a:p>
             <a:fld id="{4C7F959B-C76D-4575-9470-CE5E6063DE88}" type="datetimeFigureOut">
               <a:rPr lang="en-US" smtClean="0"/>
-              <a:t>30-Mar-18</a:t>
+              <a:t>3/31/2018</a:t>
             </a:fld>
             <a:endParaRPr lang="en-US"/>
           </a:p>
@@ -3200,7 +3200,7 @@
           <a:p>
             <a:fld id="{4C7F959B-C76D-4575-9470-CE5E6063DE88}" type="datetimeFigureOut">
               <a:rPr lang="en-US" smtClean="0"/>
-              <a:t>30-Mar-18</a:t>
+              <a:t>3/31/2018</a:t>
             </a:fld>
             <a:endParaRPr lang="en-US"/>
           </a:p>
@@ -3353,7 +3353,7 @@
           <a:p>
             <a:fld id="{4C7F959B-C76D-4575-9470-CE5E6063DE88}" type="datetimeFigureOut">
               <a:rPr lang="en-US" smtClean="0"/>
-              <a:t>30-Mar-18</a:t>
+              <a:t>3/31/2018</a:t>
             </a:fld>
             <a:endParaRPr lang="en-US"/>
           </a:p>
@@ -3478,7 +3478,7 @@
           <a:p>
             <a:fld id="{4C7F959B-C76D-4575-9470-CE5E6063DE88}" type="datetimeFigureOut">
               <a:rPr lang="en-US" smtClean="0"/>
-              <a:t>30-Mar-18</a:t>
+              <a:t>3/31/2018</a:t>
             </a:fld>
             <a:endParaRPr lang="en-US"/>
           </a:p>
@@ -3801,7 +3801,7 @@
           <a:p>
             <a:fld id="{4C7F959B-C76D-4575-9470-CE5E6063DE88}" type="datetimeFigureOut">
               <a:rPr lang="en-US" smtClean="0"/>
-              <a:t>30-Mar-18</a:t>
+              <a:t>3/31/2018</a:t>
             </a:fld>
             <a:endParaRPr lang="en-US"/>
           </a:p>
@@ -4101,7 +4101,7 @@
           <a:p>
             <a:fld id="{4C7F959B-C76D-4575-9470-CE5E6063DE88}" type="datetimeFigureOut">
               <a:rPr lang="en-US" smtClean="0"/>
-              <a:t>30-Mar-18</a:t>
+              <a:t>3/31/2018</a:t>
             </a:fld>
             <a:endParaRPr lang="en-US"/>
           </a:p>
@@ -4357,7 +4357,7 @@
           <a:p>
             <a:fld id="{4C7F959B-C76D-4575-9470-CE5E6063DE88}" type="datetimeFigureOut">
               <a:rPr lang="en-US" smtClean="0"/>
-              <a:t>30-Mar-18</a:t>
+              <a:t>3/31/2018</a:t>
             </a:fld>
             <a:endParaRPr lang="en-US"/>
           </a:p>
@@ -7162,10 +7162,10 @@
       </p:grpSpPr>
       <p:pic>
         <p:nvPicPr>
-          <p:cNvPr id="5" name="Picture 4">
-            <a:extLst>
-              <a:ext uri="{FF2B5EF4-FFF2-40B4-BE49-F238E27FC236}">
-                <a16:creationId xmlns:a16="http://schemas.microsoft.com/office/drawing/2014/main" id="{CC488ADD-2569-4DA8-8916-3276EF960442}"/>
+          <p:cNvPr id="3" name="Picture 2">
+            <a:extLst>
+              <a:ext uri="{FF2B5EF4-FFF2-40B4-BE49-F238E27FC236}">
+                <a16:creationId xmlns:a16="http://schemas.microsoft.com/office/drawing/2014/main" id="{0BE1BDC8-8F3C-4C1C-BB73-E422F8E0D538}"/>
               </a:ext>
             </a:extLst>
           </p:cNvPr>
@@ -7174,7 +7174,7 @@
           </p:cNvPicPr>
           <p:nvPr/>
         </p:nvPicPr>
-        <p:blipFill rotWithShape="1">
+        <p:blipFill>
           <a:blip r:embed="rId2">
             <a:extLst>
               <a:ext uri="{28A0092B-C50C-407E-A947-70E740481C1C}">
@@ -7182,13 +7182,14 @@
               </a:ext>
             </a:extLst>
           </a:blip>
-          <a:srcRect l="2772" r="39726" b="62500"/>
-          <a:stretch/>
+          <a:stretch>
+            <a:fillRect/>
+          </a:stretch>
         </p:blipFill>
         <p:spPr>
           <a:xfrm>
-            <a:off x="955129" y="1327355"/>
-            <a:ext cx="10281742" cy="4203290"/>
+            <a:off x="608308" y="886117"/>
+            <a:ext cx="10975383" cy="5085766"/>
           </a:xfrm>
           <a:prstGeom prst="rect">
             <a:avLst/>

</xml_diff>